<commit_message>
Finalizing Phase 2 Documents
Design Document - removed some images and rewrote references
Design Presentation - Fixed spelling issues and moving around slides
Gantt Chart - Updated to work done up to 4/10 with the completion of the document
</commit_message>
<xml_diff>
--- a/Phase 2 Documents/Chat Relay – Design Presentation.pptx
+++ b/Phase 2 Documents/Chat Relay – Design Presentation.pptx
@@ -15,8 +15,8 @@
     <p:sldId id="300" r:id="rId6"/>
     <p:sldId id="298" r:id="rId7"/>
     <p:sldId id="299" r:id="rId8"/>
-    <p:sldId id="302" r:id="rId9"/>
-    <p:sldId id="301" r:id="rId10"/>
+    <p:sldId id="301" r:id="rId9"/>
+    <p:sldId id="302" r:id="rId10"/>
     <p:sldId id="303" r:id="rId11"/>
     <p:sldId id="304" r:id="rId12"/>
     <p:sldId id="305" r:id="rId13"/>
@@ -236,7 +236,7 @@
           <a:p>
             <a:fld id="{9D8190EA-5EEC-4300-B6AE-D9734C6C648E}" type="datetimeFigureOut">
               <a:rPr lang="en-US" smtClean="0"/>
-              <a:t>4/9/2025</a:t>
+              <a:t>4/10/25</a:t>
             </a:fld>
             <a:endParaRPr lang="en-US" dirty="0"/>
           </a:p>
@@ -413,7 +413,7 @@
           <a:p>
             <a:fld id="{7487ADD9-2083-264C-A652-8D52D02F7E72}" type="datetimeFigureOut">
               <a:rPr lang="en-US" smtClean="0"/>
-              <a:t>4/9/2025</a:t>
+              <a:t>4/10/25</a:t>
             </a:fld>
             <a:endParaRPr lang="en-US" dirty="0"/>
           </a:p>
@@ -8774,6 +8774,264 @@
           <p:cNvPr id="4" name="Title 3">
             <a:extLst>
               <a:ext uri="{FF2B5EF4-FFF2-40B4-BE49-F238E27FC236}">
+                <a16:creationId xmlns:a16="http://schemas.microsoft.com/office/drawing/2014/main" id="{D53999E6-D742-F8A1-BFD9-469233FC5070}"/>
+              </a:ext>
+            </a:extLst>
+          </p:cNvPr>
+          <p:cNvSpPr>
+            <a:spLocks noGrp="1"/>
+          </p:cNvSpPr>
+          <p:nvPr>
+            <p:ph type="title"/>
+          </p:nvPr>
+        </p:nvSpPr>
+        <p:spPr/>
+        <p:txBody>
+          <a:bodyPr/>
+          <a:lstStyle/>
+          <a:p>
+            <a:r>
+              <a:rPr lang="en-US" dirty="0"/>
+              <a:t>Chat / Message</a:t>
+            </a:r>
+            <a:br>
+              <a:rPr lang="en-US" dirty="0"/>
+            </a:br>
+            <a:r>
+              <a:rPr lang="en-US" dirty="0"/>
+              <a:t>  Descriptions</a:t>
+            </a:r>
+          </a:p>
+        </p:txBody>
+      </p:sp>
+      <p:sp>
+        <p:nvSpPr>
+          <p:cNvPr id="8" name="TextBox 7">
+            <a:extLst>
+              <a:ext uri="{FF2B5EF4-FFF2-40B4-BE49-F238E27FC236}">
+                <a16:creationId xmlns:a16="http://schemas.microsoft.com/office/drawing/2014/main" id="{2F0EB69F-E41A-1D37-9825-738194885DE3}"/>
+              </a:ext>
+            </a:extLst>
+          </p:cNvPr>
+          <p:cNvSpPr txBox="1"/>
+          <p:nvPr/>
+        </p:nvSpPr>
+        <p:spPr>
+          <a:xfrm>
+            <a:off x="6837151" y="905862"/>
+            <a:ext cx="4195985" cy="4524315"/>
+          </a:xfrm>
+          <a:prstGeom prst="rect">
+            <a:avLst/>
+          </a:prstGeom>
+          <a:noFill/>
+        </p:spPr>
+        <p:txBody>
+          <a:bodyPr wrap="square" rtlCol="0">
+            <a:spAutoFit/>
+          </a:bodyPr>
+          <a:lstStyle/>
+          <a:p>
+            <a:r>
+              <a:rPr lang="en-US" b="1" dirty="0"/>
+              <a:t>Chat (Magenta)</a:t>
+            </a:r>
+            <a:r>
+              <a:rPr lang="en-US" dirty="0"/>
+              <a:t>:</a:t>
+            </a:r>
+          </a:p>
+          <a:p>
+            <a:pPr marL="285750" indent="-285750">
+              <a:buFont typeface="Arial" panose="020B0604020202020204" pitchFamily="34" charset="0"/>
+              <a:buChar char="•"/>
+            </a:pPr>
+            <a:r>
+              <a:rPr lang="en-US" b="1" dirty="0"/>
+              <a:t>Messages</a:t>
+            </a:r>
+            <a:r>
+              <a:rPr lang="en-US" dirty="0"/>
+              <a:t> – A collection of messages in the chat</a:t>
+            </a:r>
+          </a:p>
+          <a:p>
+            <a:pPr marL="285750" indent="-285750">
+              <a:buFont typeface="Arial" panose="020B0604020202020204" pitchFamily="34" charset="0"/>
+              <a:buChar char="•"/>
+            </a:pPr>
+            <a:r>
+              <a:rPr lang="en-US" b="1" dirty="0"/>
+              <a:t>Owner (Underline)</a:t>
+            </a:r>
+            <a:r>
+              <a:rPr lang="en-US" dirty="0"/>
+              <a:t> – The User who create the Chat</a:t>
+            </a:r>
+          </a:p>
+          <a:p>
+            <a:pPr marL="285750" indent="-285750">
+              <a:buFont typeface="Arial" panose="020B0604020202020204" pitchFamily="34" charset="0"/>
+              <a:buChar char="•"/>
+            </a:pPr>
+            <a:r>
+              <a:rPr lang="en-US" b="1" dirty="0"/>
+              <a:t>RoomName</a:t>
+            </a:r>
+            <a:r>
+              <a:rPr lang="en-US" dirty="0"/>
+              <a:t> – The Chat name to be displayed</a:t>
+            </a:r>
+          </a:p>
+          <a:p>
+            <a:pPr marL="285750" indent="-285750">
+              <a:buFont typeface="Arial" panose="020B0604020202020204" pitchFamily="34" charset="0"/>
+              <a:buChar char="•"/>
+            </a:pPr>
+            <a:r>
+              <a:rPr lang="en-US" b="1" dirty="0"/>
+              <a:t>Chatters</a:t>
+            </a:r>
+            <a:r>
+              <a:rPr lang="en-US" dirty="0"/>
+              <a:t> – A List of Users in the Chat</a:t>
+            </a:r>
+          </a:p>
+          <a:p>
+            <a:endParaRPr lang="en-US" dirty="0"/>
+          </a:p>
+          <a:p>
+            <a:r>
+              <a:rPr lang="en-US" b="1" dirty="0"/>
+              <a:t>Message (Green)</a:t>
+            </a:r>
+            <a:r>
+              <a:rPr lang="en-US" dirty="0"/>
+              <a:t>:</a:t>
+            </a:r>
+          </a:p>
+          <a:p>
+            <a:pPr marL="285750" indent="-285750">
+              <a:buFont typeface="Arial" panose="020B0604020202020204" pitchFamily="34" charset="0"/>
+              <a:buChar char="•"/>
+            </a:pPr>
+            <a:r>
+              <a:rPr lang="en-US" b="1" dirty="0"/>
+              <a:t>CreatedAt</a:t>
+            </a:r>
+            <a:r>
+              <a:rPr lang="en-US" dirty="0"/>
+              <a:t> – Current time the Message was created</a:t>
+            </a:r>
+          </a:p>
+          <a:p>
+            <a:pPr marL="285750" indent="-285750">
+              <a:buFont typeface="Arial" panose="020B0604020202020204" pitchFamily="34" charset="0"/>
+              <a:buChar char="•"/>
+            </a:pPr>
+            <a:r>
+              <a:rPr lang="en-US" b="1" dirty="0"/>
+              <a:t>Content</a:t>
+            </a:r>
+            <a:r>
+              <a:rPr lang="en-US" dirty="0"/>
+              <a:t> – The text being sent</a:t>
+            </a:r>
+          </a:p>
+          <a:p>
+            <a:pPr marL="285750" indent="-285750">
+              <a:buFont typeface="Arial" panose="020B0604020202020204" pitchFamily="34" charset="0"/>
+              <a:buChar char="•"/>
+            </a:pPr>
+            <a:r>
+              <a:rPr lang="en-US" b="1" dirty="0"/>
+              <a:t>Author</a:t>
+            </a:r>
+            <a:r>
+              <a:rPr lang="en-US" dirty="0"/>
+              <a:t> – The original sender</a:t>
+            </a:r>
+          </a:p>
+          <a:p>
+            <a:pPr marL="285750" indent="-285750">
+              <a:buFont typeface="Arial" panose="020B0604020202020204" pitchFamily="34" charset="0"/>
+              <a:buChar char="•"/>
+            </a:pPr>
+            <a:r>
+              <a:rPr lang="en-US" b="1" dirty="0"/>
+              <a:t>Chat</a:t>
+            </a:r>
+            <a:r>
+              <a:rPr lang="en-US" dirty="0"/>
+              <a:t> – The Chat where the Message is being sent</a:t>
+            </a:r>
+          </a:p>
+        </p:txBody>
+      </p:sp>
+      <p:pic>
+        <p:nvPicPr>
+          <p:cNvPr id="27" name="Content Placeholder 26">
+            <a:extLst>
+              <a:ext uri="{FF2B5EF4-FFF2-40B4-BE49-F238E27FC236}">
+                <a16:creationId xmlns:a16="http://schemas.microsoft.com/office/drawing/2014/main" id="{F35B2483-F75A-3B73-3B3C-2682AD1A4914}"/>
+              </a:ext>
+            </a:extLst>
+          </p:cNvPr>
+          <p:cNvPicPr>
+            <a:picLocks noGrp="1" noChangeAspect="1"/>
+          </p:cNvPicPr>
+          <p:nvPr>
+            <p:ph idx="1"/>
+          </p:nvPr>
+        </p:nvPicPr>
+        <p:blipFill>
+          <a:blip r:embed="rId2"/>
+          <a:stretch>
+            <a:fillRect/>
+          </a:stretch>
+        </p:blipFill>
+        <p:spPr>
+          <a:xfrm>
+            <a:off x="600169" y="2108767"/>
+            <a:ext cx="5888808" cy="4070652"/>
+          </a:xfrm>
+        </p:spPr>
+      </p:pic>
+    </p:spTree>
+    <p:extLst>
+      <p:ext uri="{BB962C8B-B14F-4D97-AF65-F5344CB8AC3E}">
+        <p14:creationId xmlns:p14="http://schemas.microsoft.com/office/powerpoint/2010/main" val="2687122539"/>
+      </p:ext>
+    </p:extLst>
+  </p:cSld>
+  <p:clrMapOvr>
+    <a:masterClrMapping/>
+  </p:clrMapOvr>
+</p:sld>
+</file>
+
+<file path=ppt/slides/slide6.xml><?xml version="1.0" encoding="utf-8"?>
+<p:sld xmlns:a="http://schemas.openxmlformats.org/drawingml/2006/main" xmlns:r="http://schemas.openxmlformats.org/officeDocument/2006/relationships" xmlns:p="http://schemas.openxmlformats.org/presentationml/2006/main">
+  <p:cSld>
+    <p:spTree>
+      <p:nvGrpSpPr>
+        <p:cNvPr id="1" name=""/>
+        <p:cNvGrpSpPr/>
+        <p:nvPr/>
+      </p:nvGrpSpPr>
+      <p:grpSpPr>
+        <a:xfrm>
+          <a:off x="0" y="0"/>
+          <a:ext cx="0" cy="0"/>
+          <a:chOff x="0" y="0"/>
+          <a:chExt cx="0" cy="0"/>
+        </a:xfrm>
+      </p:grpSpPr>
+      <p:sp>
+        <p:nvSpPr>
+          <p:cNvPr id="4" name="Title 3">
+            <a:extLst>
+              <a:ext uri="{FF2B5EF4-FFF2-40B4-BE49-F238E27FC236}">
                 <a16:creationId xmlns:a16="http://schemas.microsoft.com/office/drawing/2014/main" id="{D306BC3E-E238-53D3-2A3E-ED9FAC0403F6}"/>
               </a:ext>
             </a:extLst>
@@ -8869,264 +9127,6 @@
     <p:extLst>
       <p:ext uri="{BB962C8B-B14F-4D97-AF65-F5344CB8AC3E}">
         <p14:creationId xmlns:p14="http://schemas.microsoft.com/office/powerpoint/2010/main" val="1926572666"/>
-      </p:ext>
-    </p:extLst>
-  </p:cSld>
-  <p:clrMapOvr>
-    <a:masterClrMapping/>
-  </p:clrMapOvr>
-</p:sld>
-</file>
-
-<file path=ppt/slides/slide6.xml><?xml version="1.0" encoding="utf-8"?>
-<p:sld xmlns:a="http://schemas.openxmlformats.org/drawingml/2006/main" xmlns:r="http://schemas.openxmlformats.org/officeDocument/2006/relationships" xmlns:p="http://schemas.openxmlformats.org/presentationml/2006/main">
-  <p:cSld>
-    <p:spTree>
-      <p:nvGrpSpPr>
-        <p:cNvPr id="1" name=""/>
-        <p:cNvGrpSpPr/>
-        <p:nvPr/>
-      </p:nvGrpSpPr>
-      <p:grpSpPr>
-        <a:xfrm>
-          <a:off x="0" y="0"/>
-          <a:ext cx="0" cy="0"/>
-          <a:chOff x="0" y="0"/>
-          <a:chExt cx="0" cy="0"/>
-        </a:xfrm>
-      </p:grpSpPr>
-      <p:sp>
-        <p:nvSpPr>
-          <p:cNvPr id="4" name="Title 3">
-            <a:extLst>
-              <a:ext uri="{FF2B5EF4-FFF2-40B4-BE49-F238E27FC236}">
-                <a16:creationId xmlns:a16="http://schemas.microsoft.com/office/drawing/2014/main" id="{D53999E6-D742-F8A1-BFD9-469233FC5070}"/>
-              </a:ext>
-            </a:extLst>
-          </p:cNvPr>
-          <p:cNvSpPr>
-            <a:spLocks noGrp="1"/>
-          </p:cNvSpPr>
-          <p:nvPr>
-            <p:ph type="title"/>
-          </p:nvPr>
-        </p:nvSpPr>
-        <p:spPr/>
-        <p:txBody>
-          <a:bodyPr/>
-          <a:lstStyle/>
-          <a:p>
-            <a:r>
-              <a:rPr lang="en-US" dirty="0"/>
-              <a:t>Chat / Message</a:t>
-            </a:r>
-            <a:br>
-              <a:rPr lang="en-US" dirty="0"/>
-            </a:br>
-            <a:r>
-              <a:rPr lang="en-US" dirty="0"/>
-              <a:t>  Descriptions</a:t>
-            </a:r>
-          </a:p>
-        </p:txBody>
-      </p:sp>
-      <p:sp>
-        <p:nvSpPr>
-          <p:cNvPr id="8" name="TextBox 7">
-            <a:extLst>
-              <a:ext uri="{FF2B5EF4-FFF2-40B4-BE49-F238E27FC236}">
-                <a16:creationId xmlns:a16="http://schemas.microsoft.com/office/drawing/2014/main" id="{2F0EB69F-E41A-1D37-9825-738194885DE3}"/>
-              </a:ext>
-            </a:extLst>
-          </p:cNvPr>
-          <p:cNvSpPr txBox="1"/>
-          <p:nvPr/>
-        </p:nvSpPr>
-        <p:spPr>
-          <a:xfrm>
-            <a:off x="6837151" y="905862"/>
-            <a:ext cx="4195985" cy="4524315"/>
-          </a:xfrm>
-          <a:prstGeom prst="rect">
-            <a:avLst/>
-          </a:prstGeom>
-          <a:noFill/>
-        </p:spPr>
-        <p:txBody>
-          <a:bodyPr wrap="square" rtlCol="0">
-            <a:spAutoFit/>
-          </a:bodyPr>
-          <a:lstStyle/>
-          <a:p>
-            <a:r>
-              <a:rPr lang="en-US" b="1" dirty="0"/>
-              <a:t>Chat (Magenta)</a:t>
-            </a:r>
-            <a:r>
-              <a:rPr lang="en-US" dirty="0"/>
-              <a:t>:</a:t>
-            </a:r>
-          </a:p>
-          <a:p>
-            <a:pPr marL="285750" indent="-285750">
-              <a:buFont typeface="Arial" panose="020B0604020202020204" pitchFamily="34" charset="0"/>
-              <a:buChar char="•"/>
-            </a:pPr>
-            <a:r>
-              <a:rPr lang="en-US" b="1" dirty="0"/>
-              <a:t>Messages</a:t>
-            </a:r>
-            <a:r>
-              <a:rPr lang="en-US" dirty="0"/>
-              <a:t> – A collection of messages in the chat</a:t>
-            </a:r>
-          </a:p>
-          <a:p>
-            <a:pPr marL="285750" indent="-285750">
-              <a:buFont typeface="Arial" panose="020B0604020202020204" pitchFamily="34" charset="0"/>
-              <a:buChar char="•"/>
-            </a:pPr>
-            <a:r>
-              <a:rPr lang="en-US" b="1" dirty="0"/>
-              <a:t>Owner (Underline)</a:t>
-            </a:r>
-            <a:r>
-              <a:rPr lang="en-US" dirty="0"/>
-              <a:t> – The User who create the Chat</a:t>
-            </a:r>
-          </a:p>
-          <a:p>
-            <a:pPr marL="285750" indent="-285750">
-              <a:buFont typeface="Arial" panose="020B0604020202020204" pitchFamily="34" charset="0"/>
-              <a:buChar char="•"/>
-            </a:pPr>
-            <a:r>
-              <a:rPr lang="en-US" b="1" dirty="0"/>
-              <a:t>RoomName</a:t>
-            </a:r>
-            <a:r>
-              <a:rPr lang="en-US" dirty="0"/>
-              <a:t> – The Chat name to be displayed</a:t>
-            </a:r>
-          </a:p>
-          <a:p>
-            <a:pPr marL="285750" indent="-285750">
-              <a:buFont typeface="Arial" panose="020B0604020202020204" pitchFamily="34" charset="0"/>
-              <a:buChar char="•"/>
-            </a:pPr>
-            <a:r>
-              <a:rPr lang="en-US" b="1" dirty="0"/>
-              <a:t>Chatters</a:t>
-            </a:r>
-            <a:r>
-              <a:rPr lang="en-US" dirty="0"/>
-              <a:t> – A List of Users in the Chat</a:t>
-            </a:r>
-          </a:p>
-          <a:p>
-            <a:endParaRPr lang="en-US" dirty="0"/>
-          </a:p>
-          <a:p>
-            <a:r>
-              <a:rPr lang="en-US" b="1" dirty="0"/>
-              <a:t>Message (Green)</a:t>
-            </a:r>
-            <a:r>
-              <a:rPr lang="en-US" dirty="0"/>
-              <a:t>:</a:t>
-            </a:r>
-          </a:p>
-          <a:p>
-            <a:pPr marL="285750" indent="-285750">
-              <a:buFont typeface="Arial" panose="020B0604020202020204" pitchFamily="34" charset="0"/>
-              <a:buChar char="•"/>
-            </a:pPr>
-            <a:r>
-              <a:rPr lang="en-US" b="1" dirty="0"/>
-              <a:t>CreatedAt</a:t>
-            </a:r>
-            <a:r>
-              <a:rPr lang="en-US" dirty="0"/>
-              <a:t> – Current time the Message was created</a:t>
-            </a:r>
-          </a:p>
-          <a:p>
-            <a:pPr marL="285750" indent="-285750">
-              <a:buFont typeface="Arial" panose="020B0604020202020204" pitchFamily="34" charset="0"/>
-              <a:buChar char="•"/>
-            </a:pPr>
-            <a:r>
-              <a:rPr lang="en-US" b="1" dirty="0"/>
-              <a:t>Content</a:t>
-            </a:r>
-            <a:r>
-              <a:rPr lang="en-US" dirty="0"/>
-              <a:t> – The text being sent</a:t>
-            </a:r>
-          </a:p>
-          <a:p>
-            <a:pPr marL="285750" indent="-285750">
-              <a:buFont typeface="Arial" panose="020B0604020202020204" pitchFamily="34" charset="0"/>
-              <a:buChar char="•"/>
-            </a:pPr>
-            <a:r>
-              <a:rPr lang="en-US" b="1" dirty="0"/>
-              <a:t>Author</a:t>
-            </a:r>
-            <a:r>
-              <a:rPr lang="en-US" dirty="0"/>
-              <a:t> – The original sender</a:t>
-            </a:r>
-          </a:p>
-          <a:p>
-            <a:pPr marL="285750" indent="-285750">
-              <a:buFont typeface="Arial" panose="020B0604020202020204" pitchFamily="34" charset="0"/>
-              <a:buChar char="•"/>
-            </a:pPr>
-            <a:r>
-              <a:rPr lang="en-US" b="1" dirty="0"/>
-              <a:t>Chat</a:t>
-            </a:r>
-            <a:r>
-              <a:rPr lang="en-US" dirty="0"/>
-              <a:t> – The Chat where the Message is being sent</a:t>
-            </a:r>
-          </a:p>
-        </p:txBody>
-      </p:sp>
-      <p:pic>
-        <p:nvPicPr>
-          <p:cNvPr id="27" name="Content Placeholder 26">
-            <a:extLst>
-              <a:ext uri="{FF2B5EF4-FFF2-40B4-BE49-F238E27FC236}">
-                <a16:creationId xmlns:a16="http://schemas.microsoft.com/office/drawing/2014/main" id="{F35B2483-F75A-3B73-3B3C-2682AD1A4914}"/>
-              </a:ext>
-            </a:extLst>
-          </p:cNvPr>
-          <p:cNvPicPr>
-            <a:picLocks noGrp="1" noChangeAspect="1"/>
-          </p:cNvPicPr>
-          <p:nvPr>
-            <p:ph idx="1"/>
-          </p:nvPr>
-        </p:nvPicPr>
-        <p:blipFill>
-          <a:blip r:embed="rId2"/>
-          <a:stretch>
-            <a:fillRect/>
-          </a:stretch>
-        </p:blipFill>
-        <p:spPr>
-          <a:xfrm>
-            <a:off x="600169" y="2108767"/>
-            <a:ext cx="5888808" cy="4070652"/>
-          </a:xfrm>
-        </p:spPr>
-      </p:pic>
-    </p:spTree>
-    <p:extLst>
-      <p:ext uri="{BB962C8B-B14F-4D97-AF65-F5344CB8AC3E}">
-        <p14:creationId xmlns:p14="http://schemas.microsoft.com/office/powerpoint/2010/main" val="2687122539"/>
       </p:ext>
     </p:extLst>
   </p:cSld>
@@ -10830,20 +10830,20 @@
 </file>
 
 <file path=customXml/item1.xml><?xml version="1.0" encoding="utf-8"?>
+<p:properties xmlns:p="http://schemas.microsoft.com/office/2006/metadata/properties" xmlns:xsi="http://www.w3.org/2001/XMLSchema-instance" xmlns:pc="http://schemas.microsoft.com/office/infopath/2007/PartnerControls">
+  <documentManagement>
+    <_activity xmlns="6ca33456-d870-4b02-a8cd-2177d9726975" xsi:nil="true"/>
+  </documentManagement>
+</p:properties>
+</file>
+
+<file path=customXml/item2.xml><?xml version="1.0" encoding="utf-8"?>
 <?mso-contentType ?>
 <FormTemplates xmlns="http://schemas.microsoft.com/sharepoint/v3/contenttype/forms">
   <Display>DocumentLibraryForm</Display>
   <Edit>DocumentLibraryForm</Edit>
   <New>DocumentLibraryForm</New>
 </FormTemplates>
-</file>
-
-<file path=customXml/item2.xml><?xml version="1.0" encoding="utf-8"?>
-<p:properties xmlns:p="http://schemas.microsoft.com/office/2006/metadata/properties" xmlns:xsi="http://www.w3.org/2001/XMLSchema-instance" xmlns:pc="http://schemas.microsoft.com/office/infopath/2007/PartnerControls">
-  <documentManagement>
-    <_activity xmlns="6ca33456-d870-4b02-a8cd-2177d9726975" xsi:nil="true"/>
-  </documentManagement>
-</p:properties>
 </file>
 
 <file path=customXml/item3.xml><?xml version="1.0" encoding="utf-8"?>
@@ -11029,14 +11029,6 @@
 </file>
 
 <file path=customXml/itemProps1.xml><?xml version="1.0" encoding="utf-8"?>
-<ds:datastoreItem xmlns:ds="http://schemas.openxmlformats.org/officeDocument/2006/customXml" ds:itemID="{45A8381C-73EB-48EA-B45F-7B7C8C7DF409}">
-  <ds:schemaRefs>
-    <ds:schemaRef ds:uri="http://schemas.microsoft.com/sharepoint/v3/contenttype/forms"/>
-  </ds:schemaRefs>
-</ds:datastoreItem>
-</file>
-
-<file path=customXml/itemProps2.xml><?xml version="1.0" encoding="utf-8"?>
 <ds:datastoreItem xmlns:ds="http://schemas.openxmlformats.org/officeDocument/2006/customXml" ds:itemID="{61E98C35-9ECE-4425-BCBA-00E118C705CE}">
   <ds:schemaRefs>
     <ds:schemaRef ds:uri="http://purl.org/dc/dcmitype/"/>
@@ -11048,6 +11040,14 @@
     <ds:schemaRef ds:uri="http://purl.org/dc/terms/"/>
     <ds:schemaRef ds:uri="http://purl.org/dc/elements/1.1/"/>
     <ds:schemaRef ds:uri="http://schemas.microsoft.com/office/infopath/2007/PartnerControls"/>
+  </ds:schemaRefs>
+</ds:datastoreItem>
+</file>
+
+<file path=customXml/itemProps2.xml><?xml version="1.0" encoding="utf-8"?>
+<ds:datastoreItem xmlns:ds="http://schemas.openxmlformats.org/officeDocument/2006/customXml" ds:itemID="{45A8381C-73EB-48EA-B45F-7B7C8C7DF409}">
+  <ds:schemaRefs>
+    <ds:schemaRef ds:uri="http://schemas.microsoft.com/sharepoint/v3/contenttype/forms"/>
   </ds:schemaRefs>
 </ds:datastoreItem>
 </file>

</xml_diff>